<commit_message>
thêm ý nghĩa của entropy và gini
</commit_message>
<xml_diff>
--- a/slide/decision_tree.pptx
+++ b/slide/decision_tree.pptx
@@ -12721,27 +12721,6 @@
                       </a:rPr>
                       <m:t>−</m:t>
                     </m:r>
-                    <m:r>
-                      <a:rPr lang="en-US" sz="3200" i="1">
-                        <a:latin typeface="Cambria Math" panose="02040503050406030204" charset="0"/>
-                        <a:cs typeface="Cambria Math" panose="02040503050406030204" charset="0"/>
-                      </a:rPr>
-                      <m:t>(</m:t>
-                    </m:r>
-                    <m:r>
-                      <a:rPr lang="en-US" sz="3200" i="1">
-                        <a:latin typeface="Cambria Math" panose="02040503050406030204" charset="0"/>
-                        <a:cs typeface="Cambria Math" panose="02040503050406030204" charset="0"/>
-                      </a:rPr>
-                      <m:t>1</m:t>
-                    </m:r>
-                    <m:r>
-                      <a:rPr lang="en-US" sz="3200" i="1">
-                        <a:latin typeface="Cambria Math" panose="02040503050406030204" charset="0"/>
-                        <a:cs typeface="Cambria Math" panose="02040503050406030204" charset="0"/>
-                      </a:rPr>
-                      <m:t>−</m:t>
-                    </m:r>
                     <m:sSup>
                       <m:sSupPr>
                         <m:ctrlPr>
@@ -12752,6 +12731,27 @@
                         </m:ctrlPr>
                       </m:sSupPr>
                       <m:e>
+                        <m:r>
+                          <a:rPr lang="en-US" i="1">
+                            <a:latin typeface="Cambria Math" panose="02040503050406030204" charset="0"/>
+                            <a:cs typeface="Cambria Math" panose="02040503050406030204" charset="0"/>
+                          </a:rPr>
+                          <m:t>(</m:t>
+                        </m:r>
+                        <m:r>
+                          <a:rPr lang="en-US" i="1">
+                            <a:latin typeface="Cambria Math" panose="02040503050406030204" charset="0"/>
+                            <a:cs typeface="Cambria Math" panose="02040503050406030204" charset="0"/>
+                          </a:rPr>
+                          <m:t>1</m:t>
+                        </m:r>
+                        <m:r>
+                          <a:rPr lang="en-US" i="1">
+                            <a:latin typeface="Cambria Math" panose="02040503050406030204" charset="0"/>
+                            <a:cs typeface="Cambria Math" panose="02040503050406030204" charset="0"/>
+                          </a:rPr>
+                          <m:t>−</m:t>
+                        </m:r>
                         <m:sSub>
                           <m:sSubPr>
                             <m:ctrlPr>
@@ -12780,6 +12780,13 @@
                             </m:r>
                           </m:sub>
                         </m:sSub>
+                        <m:r>
+                          <a:rPr lang="en-US" i="1">
+                            <a:latin typeface="Cambria Math" panose="02040503050406030204" charset="0"/>
+                            <a:cs typeface="Cambria Math" panose="02040503050406030204" charset="0"/>
+                          </a:rPr>
+                          <m:t>)</m:t>
+                        </m:r>
                       </m:e>
                       <m:sup>
                         <m:r>
@@ -12791,13 +12798,6 @@
                         </m:r>
                       </m:sup>
                     </m:sSup>
-                    <m:r>
-                      <a:rPr lang="en-US" i="1">
-                        <a:latin typeface="Cambria Math" panose="02040503050406030204" charset="0"/>
-                        <a:cs typeface="Cambria Math" panose="02040503050406030204" charset="0"/>
-                      </a:rPr>
-                      <m:t>)</m:t>
-                    </m:r>
                   </m:oMath>
                 </a14:m>
                 <a:endParaRPr lang="en-US" sz="3200" i="1">

</xml_diff>